<commit_message>
get path still broken
going to try restarting
</commit_message>
<xml_diff>
--- a/plans/Presentation1.pptx
+++ b/plans/Presentation1.pptx
@@ -109,6 +109,11 @@
       </a:defRPr>
     </a:lvl9pPr>
   </p:defaultTextStyle>
+  <p:extLst>
+    <p:ext uri="{EFAFB233-063F-42B5-8137-9DF3F51BA10A}">
+      <p15:sldGuideLst xmlns:p15="http://schemas.microsoft.com/office/powerpoint/2012/main"/>
+    </p:ext>
+  </p:extLst>
 </p:presentation>
 </file>
 
@@ -259,7 +264,7 @@
           <a:p>
             <a:fld id="{F4DDAA29-5A92-4B33-909B-E564243B592B}" type="datetimeFigureOut">
               <a:rPr lang="en-US" smtClean="0"/>
-              <a:t>12/18/2021</a:t>
+              <a:t>12/23/2021</a:t>
             </a:fld>
             <a:endParaRPr lang="en-US"/>
           </a:p>
@@ -457,7 +462,7 @@
           <a:p>
             <a:fld id="{F4DDAA29-5A92-4B33-909B-E564243B592B}" type="datetimeFigureOut">
               <a:rPr lang="en-US" smtClean="0"/>
-              <a:t>12/18/2021</a:t>
+              <a:t>12/23/2021</a:t>
             </a:fld>
             <a:endParaRPr lang="en-US"/>
           </a:p>
@@ -665,7 +670,7 @@
           <a:p>
             <a:fld id="{F4DDAA29-5A92-4B33-909B-E564243B592B}" type="datetimeFigureOut">
               <a:rPr lang="en-US" smtClean="0"/>
-              <a:t>12/18/2021</a:t>
+              <a:t>12/23/2021</a:t>
             </a:fld>
             <a:endParaRPr lang="en-US"/>
           </a:p>
@@ -863,7 +868,7 @@
           <a:p>
             <a:fld id="{F4DDAA29-5A92-4B33-909B-E564243B592B}" type="datetimeFigureOut">
               <a:rPr lang="en-US" smtClean="0"/>
-              <a:t>12/18/2021</a:t>
+              <a:t>12/23/2021</a:t>
             </a:fld>
             <a:endParaRPr lang="en-US"/>
           </a:p>
@@ -1138,7 +1143,7 @@
           <a:p>
             <a:fld id="{F4DDAA29-5A92-4B33-909B-E564243B592B}" type="datetimeFigureOut">
               <a:rPr lang="en-US" smtClean="0"/>
-              <a:t>12/18/2021</a:t>
+              <a:t>12/23/2021</a:t>
             </a:fld>
             <a:endParaRPr lang="en-US"/>
           </a:p>
@@ -1403,7 +1408,7 @@
           <a:p>
             <a:fld id="{F4DDAA29-5A92-4B33-909B-E564243B592B}" type="datetimeFigureOut">
               <a:rPr lang="en-US" smtClean="0"/>
-              <a:t>12/18/2021</a:t>
+              <a:t>12/23/2021</a:t>
             </a:fld>
             <a:endParaRPr lang="en-US"/>
           </a:p>
@@ -1815,7 +1820,7 @@
           <a:p>
             <a:fld id="{F4DDAA29-5A92-4B33-909B-E564243B592B}" type="datetimeFigureOut">
               <a:rPr lang="en-US" smtClean="0"/>
-              <a:t>12/18/2021</a:t>
+              <a:t>12/23/2021</a:t>
             </a:fld>
             <a:endParaRPr lang="en-US"/>
           </a:p>
@@ -1956,7 +1961,7 @@
           <a:p>
             <a:fld id="{F4DDAA29-5A92-4B33-909B-E564243B592B}" type="datetimeFigureOut">
               <a:rPr lang="en-US" smtClean="0"/>
-              <a:t>12/18/2021</a:t>
+              <a:t>12/23/2021</a:t>
             </a:fld>
             <a:endParaRPr lang="en-US"/>
           </a:p>
@@ -2069,7 +2074,7 @@
           <a:p>
             <a:fld id="{F4DDAA29-5A92-4B33-909B-E564243B592B}" type="datetimeFigureOut">
               <a:rPr lang="en-US" smtClean="0"/>
-              <a:t>12/18/2021</a:t>
+              <a:t>12/23/2021</a:t>
             </a:fld>
             <a:endParaRPr lang="en-US"/>
           </a:p>
@@ -2380,7 +2385,7 @@
           <a:p>
             <a:fld id="{F4DDAA29-5A92-4B33-909B-E564243B592B}" type="datetimeFigureOut">
               <a:rPr lang="en-US" smtClean="0"/>
-              <a:t>12/18/2021</a:t>
+              <a:t>12/23/2021</a:t>
             </a:fld>
             <a:endParaRPr lang="en-US"/>
           </a:p>
@@ -2668,7 +2673,7 @@
           <a:p>
             <a:fld id="{F4DDAA29-5A92-4B33-909B-E564243B592B}" type="datetimeFigureOut">
               <a:rPr lang="en-US" smtClean="0"/>
-              <a:t>12/18/2021</a:t>
+              <a:t>12/23/2021</a:t>
             </a:fld>
             <a:endParaRPr lang="en-US"/>
           </a:p>
@@ -2909,7 +2914,7 @@
           <a:p>
             <a:fld id="{F4DDAA29-5A92-4B33-909B-E564243B592B}" type="datetimeFigureOut">
               <a:rPr lang="en-US" smtClean="0"/>
-              <a:t>12/18/2021</a:t>
+              <a:t>12/23/2021</a:t>
             </a:fld>
             <a:endParaRPr lang="en-US"/>
           </a:p>
@@ -10061,6 +10066,208 @@
           </a:p>
         </p:txBody>
       </p:sp>
+      <p:sp>
+        <p:nvSpPr>
+          <p:cNvPr id="6" name="Rectangle 5">
+            <a:extLst>
+              <a:ext uri="{FF2B5EF4-FFF2-40B4-BE49-F238E27FC236}">
+                <a16:creationId xmlns:a16="http://schemas.microsoft.com/office/drawing/2014/main" id="{0CAE65D8-2226-49A2-9C2D-1F520AAEA22B}"/>
+              </a:ext>
+            </a:extLst>
+          </p:cNvPr>
+          <p:cNvSpPr/>
+          <p:nvPr/>
+        </p:nvSpPr>
+        <p:spPr>
+          <a:xfrm>
+            <a:off x="7406135" y="1525683"/>
+            <a:ext cx="4090705" cy="5248959"/>
+          </a:xfrm>
+          <a:prstGeom prst="rect">
+            <a:avLst/>
+          </a:prstGeom>
+        </p:spPr>
+        <p:style>
+          <a:lnRef idx="2">
+            <a:schemeClr val="accent1">
+              <a:shade val="50000"/>
+            </a:schemeClr>
+          </a:lnRef>
+          <a:fillRef idx="1">
+            <a:schemeClr val="accent1"/>
+          </a:fillRef>
+          <a:effectRef idx="0">
+            <a:schemeClr val="accent1"/>
+          </a:effectRef>
+          <a:fontRef idx="minor">
+            <a:schemeClr val="lt1"/>
+          </a:fontRef>
+        </p:style>
+        <p:txBody>
+          <a:bodyPr rtlCol="0" anchor="ctr"/>
+          <a:lstStyle/>
+          <a:p>
+            <a:pPr algn="ctr"/>
+            <a:r>
+              <a:rPr lang="en-US" sz="800" dirty="0"/>
+              <a:t>Artifacts:</a:t>
+            </a:r>
+          </a:p>
+          <a:p>
+            <a:pPr algn="ctr"/>
+            <a:endParaRPr lang="en-US" sz="800" dirty="0"/>
+          </a:p>
+          <a:p>
+            <a:pPr algn="ctr"/>
+            <a:r>
+              <a:rPr lang="en-US" sz="800" dirty="0"/>
+              <a:t>Once equipped cannot be unequipped forever! All of these are valuable and can be sold for a lot. Should be very strong but always have a drawback.</a:t>
+            </a:r>
+          </a:p>
+          <a:p>
+            <a:pPr algn="ctr"/>
+            <a:endParaRPr lang="en-US" sz="800" dirty="0"/>
+          </a:p>
+          <a:p>
+            <a:pPr algn="ctr"/>
+            <a:r>
+              <a:rPr lang="en-US" sz="800" dirty="0"/>
+              <a:t>Shadow sword: Immense power but you can only use it when someone is in your party. Each time you use it the sword ages your party member by five years. It curses them so that they don’t question their rapid aging but you can tell them about it if you choose. (they will immediately leave your party). If nobody in your party then it ages you by five years each day.</a:t>
+            </a:r>
+          </a:p>
+          <a:p>
+            <a:pPr algn="ctr"/>
+            <a:endParaRPr lang="en-US" sz="800" dirty="0"/>
+          </a:p>
+          <a:p>
+            <a:pPr algn="ctr"/>
+            <a:r>
+              <a:rPr lang="en-US" sz="800" dirty="0"/>
+              <a:t>Light sword: Immense power but each time you use it a year is taken off of your lifespan</a:t>
+            </a:r>
+          </a:p>
+          <a:p>
+            <a:pPr algn="ctr"/>
+            <a:endParaRPr lang="en-US" sz="800" dirty="0"/>
+          </a:p>
+          <a:p>
+            <a:pPr algn="ctr"/>
+            <a:r>
+              <a:rPr lang="en-US" sz="800" dirty="0"/>
+              <a:t>Insanity sword: The lower your initial combat power, the bigger the bonus it will give you. Especially if you have negative combat power through cursed items, </a:t>
+            </a:r>
+            <a:r>
+              <a:rPr lang="en-US" sz="800" dirty="0" err="1"/>
+              <a:t>debuffs</a:t>
+            </a:r>
+            <a:r>
+              <a:rPr lang="en-US" sz="800" dirty="0"/>
+              <a:t>, etc. It replaces dialogue with insanity ‘HAHAHA’.</a:t>
+            </a:r>
+          </a:p>
+          <a:p>
+            <a:pPr algn="ctr"/>
+            <a:endParaRPr lang="en-US" sz="800" dirty="0"/>
+          </a:p>
+          <a:p>
+            <a:pPr algn="ctr"/>
+            <a:r>
+              <a:rPr lang="en-US" sz="800" dirty="0"/>
+              <a:t>Dream sword: completely randomized power value for each fight. Can be both extremely strong and extremely weak. Middling values are ignored so its always either amazing or terrible.</a:t>
+            </a:r>
+          </a:p>
+          <a:p>
+            <a:pPr algn="ctr"/>
+            <a:endParaRPr lang="en-US" sz="800" dirty="0"/>
+          </a:p>
+          <a:p>
+            <a:pPr algn="ctr"/>
+            <a:r>
+              <a:rPr lang="en-US" sz="800" dirty="0"/>
+              <a:t>God sword: you whisper a characters name to it and it gives you near infinite power against them. Against everyone else it is useless.</a:t>
+            </a:r>
+          </a:p>
+          <a:p>
+            <a:pPr algn="ctr"/>
+            <a:endParaRPr lang="en-US" sz="800" dirty="0"/>
+          </a:p>
+          <a:p>
+            <a:pPr algn="ctr"/>
+            <a:r>
+              <a:rPr lang="en-US" sz="800" dirty="0"/>
+              <a:t>Devil sword: gives immense power but causes all to hate you.</a:t>
+            </a:r>
+          </a:p>
+          <a:p>
+            <a:pPr algn="ctr"/>
+            <a:endParaRPr lang="en-US" sz="800" dirty="0"/>
+          </a:p>
+          <a:p>
+            <a:pPr algn="ctr"/>
+            <a:r>
+              <a:rPr lang="en-US" sz="800" dirty="0"/>
+              <a:t>Occam’s </a:t>
+            </a:r>
+            <a:r>
+              <a:rPr lang="en-US" sz="800" dirty="0" err="1"/>
+              <a:t>monacle</a:t>
+            </a:r>
+            <a:r>
+              <a:rPr lang="en-US" sz="800" dirty="0"/>
+              <a:t>: tells you the affinity every character holds towards you when you talk to them. They naturally dislike that however and lose a few points with you.</a:t>
+            </a:r>
+          </a:p>
+          <a:p>
+            <a:pPr algn="ctr"/>
+            <a:endParaRPr lang="en-US" sz="800" dirty="0"/>
+          </a:p>
+          <a:p>
+            <a:pPr algn="ctr"/>
+            <a:r>
+              <a:rPr lang="en-US" sz="800" dirty="0" err="1"/>
+              <a:t>Mida’s</a:t>
+            </a:r>
+            <a:r>
+              <a:rPr lang="en-US" sz="800" dirty="0"/>
+              <a:t> glove: if you point it at a person who holds at least neutral affinity towards you, it instantly kills them and you gain a large amount of gold. Everyone nearby knows it was you that did it however.</a:t>
+            </a:r>
+          </a:p>
+          <a:p>
+            <a:pPr algn="ctr"/>
+            <a:endParaRPr lang="en-US" sz="800" dirty="0"/>
+          </a:p>
+          <a:p>
+            <a:pPr algn="ctr"/>
+            <a:r>
+              <a:rPr lang="en-US" sz="800" dirty="0"/>
+              <a:t>Loner’s cloak: allows you to </a:t>
+            </a:r>
+            <a:r>
+              <a:rPr lang="en-US" sz="800" dirty="0" err="1"/>
+              <a:t>guarunteed</a:t>
+            </a:r>
+            <a:r>
+              <a:rPr lang="en-US" sz="800" dirty="0"/>
+              <a:t> escape from any fight, however you cannot invite people to join your party.</a:t>
+            </a:r>
+          </a:p>
+          <a:p>
+            <a:pPr algn="ctr"/>
+            <a:endParaRPr lang="en-US" sz="800" dirty="0"/>
+          </a:p>
+          <a:p>
+            <a:pPr algn="ctr"/>
+            <a:r>
+              <a:rPr lang="en-US" sz="800" dirty="0" err="1"/>
+              <a:t>Ciri’s</a:t>
+            </a:r>
+            <a:r>
+              <a:rPr lang="en-US" sz="800" dirty="0"/>
+              <a:t> boots: allows you to teleport to any location, but it always leaves behind your entire inventory and party members.</a:t>
+            </a:r>
+          </a:p>
+        </p:txBody>
+      </p:sp>
     </p:spTree>
     <p:extLst>
       <p:ext uri="{BB962C8B-B14F-4D97-AF65-F5344CB8AC3E}">

</xml_diff>